<commit_message>
Updating the reproducibility scripts for the new version of the manuscript.
</commit_message>
<xml_diff>
--- a/test/figures/overlap/overlapping.pptx
+++ b/test/figures/overlap/overlapping.pptx
@@ -5,14 +5,13 @@
     <p:sldMasterId id="2147483660" r:id="rId1"/>
   </p:sldMasterIdLst>
   <p:notesMasterIdLst>
-    <p:notesMasterId r:id="rId7"/>
+    <p:notesMasterId r:id="rId6"/>
   </p:notesMasterIdLst>
   <p:sldIdLst>
     <p:sldId id="4627" r:id="rId2"/>
     <p:sldId id="4634" r:id="rId3"/>
     <p:sldId id="4629" r:id="rId4"/>
     <p:sldId id="4630" r:id="rId5"/>
-    <p:sldId id="4633" r:id="rId6"/>
   </p:sldIdLst>
   <p:sldSz cx="18592800" cy="6858000"/>
   <p:notesSz cx="6858000" cy="9144000"/>
@@ -201,7 +200,7 @@
           <a:p>
             <a:fld id="{52D9FB99-33AF-45C7-9798-F9BB105B9B87}" type="datetimeFigureOut">
               <a:rPr lang="en-US" smtClean="0"/>
-              <a:t>10/31/22</a:t>
+              <a:t>11/21/22</a:t>
             </a:fld>
             <a:endParaRPr lang="en-US"/>
           </a:p>
@@ -840,99 +839,6 @@
 </p:notes>
 </file>
 
-<file path=ppt/notesSlides/notesSlide5.xml><?xml version="1.0" encoding="utf-8"?>
-<p:notes xmlns:a="http://schemas.openxmlformats.org/drawingml/2006/main" xmlns:r="http://schemas.openxmlformats.org/officeDocument/2006/relationships" xmlns:p="http://schemas.openxmlformats.org/presentationml/2006/main">
-  <p:cSld>
-    <p:spTree>
-      <p:nvGrpSpPr>
-        <p:cNvPr id="1" name=""/>
-        <p:cNvGrpSpPr/>
-        <p:nvPr/>
-      </p:nvGrpSpPr>
-      <p:grpSpPr>
-        <a:xfrm>
-          <a:off x="0" y="0"/>
-          <a:ext cx="0" cy="0"/>
-          <a:chOff x="0" y="0"/>
-          <a:chExt cx="0" cy="0"/>
-        </a:xfrm>
-      </p:grpSpPr>
-      <p:sp>
-        <p:nvSpPr>
-          <p:cNvPr id="2" name="Slide Image Placeholder 1"/>
-          <p:cNvSpPr>
-            <a:spLocks noGrp="1" noRot="1" noChangeAspect="1"/>
-          </p:cNvSpPr>
-          <p:nvPr>
-            <p:ph type="sldImg"/>
-          </p:nvPr>
-        </p:nvSpPr>
-        <p:spPr>
-          <a:xfrm>
-            <a:off x="-754063" y="1143000"/>
-            <a:ext cx="8366126" cy="3086100"/>
-          </a:xfrm>
-        </p:spPr>
-      </p:sp>
-      <p:sp>
-        <p:nvSpPr>
-          <p:cNvPr id="3" name="Notes Placeholder 2"/>
-          <p:cNvSpPr>
-            <a:spLocks noGrp="1"/>
-          </p:cNvSpPr>
-          <p:nvPr>
-            <p:ph type="body" idx="1"/>
-          </p:nvPr>
-        </p:nvSpPr>
-        <p:spPr/>
-        <p:txBody>
-          <a:bodyPr/>
-          <a:lstStyle/>
-          <a:p>
-            <a:r>
-              <a:rPr lang="en-US" dirty="0" err="1"/>
-              <a:t>overlap_stats.pdf</a:t>
-            </a:r>
-            <a:endParaRPr lang="en-US" dirty="0"/>
-          </a:p>
-        </p:txBody>
-      </p:sp>
-      <p:sp>
-        <p:nvSpPr>
-          <p:cNvPr id="4" name="Slide Number Placeholder 3"/>
-          <p:cNvSpPr>
-            <a:spLocks noGrp="1"/>
-          </p:cNvSpPr>
-          <p:nvPr>
-            <p:ph type="sldNum" sz="quarter" idx="5"/>
-          </p:nvPr>
-        </p:nvSpPr>
-        <p:spPr/>
-        <p:txBody>
-          <a:bodyPr/>
-          <a:lstStyle/>
-          <a:p>
-            <a:fld id="{FB8EC415-AB61-4AAF-95EC-A94D821E2AEB}" type="slidenum">
-              <a:rPr lang="en-US" smtClean="0"/>
-              <a:t>5</a:t>
-            </a:fld>
-            <a:endParaRPr lang="en-US"/>
-          </a:p>
-        </p:txBody>
-      </p:sp>
-    </p:spTree>
-    <p:extLst>
-      <p:ext uri="{BB962C8B-B14F-4D97-AF65-F5344CB8AC3E}">
-        <p14:creationId xmlns:p14="http://schemas.microsoft.com/office/powerpoint/2010/main" val="2424083371"/>
-      </p:ext>
-    </p:extLst>
-  </p:cSld>
-  <p:clrMapOvr>
-    <a:masterClrMapping/>
-  </p:clrMapOvr>
-</p:notes>
-</file>
-
 <file path=ppt/slideLayouts/slideLayout1.xml><?xml version="1.0" encoding="utf-8"?>
 <p:sldLayout xmlns:a="http://schemas.openxmlformats.org/drawingml/2006/main" xmlns:r="http://schemas.openxmlformats.org/officeDocument/2006/relationships" xmlns:p="http://schemas.openxmlformats.org/presentationml/2006/main" type="title" preserve="1">
   <p:cSld name="Title Slide">
@@ -1064,7 +970,7 @@
           <a:p>
             <a:fld id="{E3A9BCBE-8A83-4E67-B3B6-D6A7A53377E1}" type="datetimeFigureOut">
               <a:rPr lang="en-US" smtClean="0"/>
-              <a:t>10/31/22</a:t>
+              <a:t>11/21/22</a:t>
             </a:fld>
             <a:endParaRPr lang="en-US"/>
           </a:p>
@@ -1234,7 +1140,7 @@
           <a:p>
             <a:fld id="{E3A9BCBE-8A83-4E67-B3B6-D6A7A53377E1}" type="datetimeFigureOut">
               <a:rPr lang="en-US" smtClean="0"/>
-              <a:t>10/31/22</a:t>
+              <a:t>11/21/22</a:t>
             </a:fld>
             <a:endParaRPr lang="en-US"/>
           </a:p>
@@ -1414,7 +1320,7 @@
           <a:p>
             <a:fld id="{E3A9BCBE-8A83-4E67-B3B6-D6A7A53377E1}" type="datetimeFigureOut">
               <a:rPr lang="en-US" smtClean="0"/>
-              <a:t>10/31/22</a:t>
+              <a:t>11/21/22</a:t>
             </a:fld>
             <a:endParaRPr lang="en-US"/>
           </a:p>
@@ -1584,7 +1490,7 @@
           <a:p>
             <a:fld id="{E3A9BCBE-8A83-4E67-B3B6-D6A7A53377E1}" type="datetimeFigureOut">
               <a:rPr lang="en-US" smtClean="0"/>
-              <a:t>10/31/22</a:t>
+              <a:t>11/21/22</a:t>
             </a:fld>
             <a:endParaRPr lang="en-US"/>
           </a:p>
@@ -1830,7 +1736,7 @@
           <a:p>
             <a:fld id="{E3A9BCBE-8A83-4E67-B3B6-D6A7A53377E1}" type="datetimeFigureOut">
               <a:rPr lang="en-US" smtClean="0"/>
-              <a:t>10/31/22</a:t>
+              <a:t>11/21/22</a:t>
             </a:fld>
             <a:endParaRPr lang="en-US"/>
           </a:p>
@@ -2062,7 +1968,7 @@
           <a:p>
             <a:fld id="{E3A9BCBE-8A83-4E67-B3B6-D6A7A53377E1}" type="datetimeFigureOut">
               <a:rPr lang="en-US" smtClean="0"/>
-              <a:t>10/31/22</a:t>
+              <a:t>11/21/22</a:t>
             </a:fld>
             <a:endParaRPr lang="en-US"/>
           </a:p>
@@ -2429,7 +2335,7 @@
           <a:p>
             <a:fld id="{E3A9BCBE-8A83-4E67-B3B6-D6A7A53377E1}" type="datetimeFigureOut">
               <a:rPr lang="en-US" smtClean="0"/>
-              <a:t>10/31/22</a:t>
+              <a:t>11/21/22</a:t>
             </a:fld>
             <a:endParaRPr lang="en-US"/>
           </a:p>
@@ -2547,7 +2453,7 @@
           <a:p>
             <a:fld id="{E3A9BCBE-8A83-4E67-B3B6-D6A7A53377E1}" type="datetimeFigureOut">
               <a:rPr lang="en-US" smtClean="0"/>
-              <a:t>10/31/22</a:t>
+              <a:t>11/21/22</a:t>
             </a:fld>
             <a:endParaRPr lang="en-US"/>
           </a:p>
@@ -2642,7 +2548,7 @@
           <a:p>
             <a:fld id="{E3A9BCBE-8A83-4E67-B3B6-D6A7A53377E1}" type="datetimeFigureOut">
               <a:rPr lang="en-US" smtClean="0"/>
-              <a:t>10/31/22</a:t>
+              <a:t>11/21/22</a:t>
             </a:fld>
             <a:endParaRPr lang="en-US"/>
           </a:p>
@@ -2919,7 +2825,7 @@
           <a:p>
             <a:fld id="{E3A9BCBE-8A83-4E67-B3B6-D6A7A53377E1}" type="datetimeFigureOut">
               <a:rPr lang="en-US" smtClean="0"/>
-              <a:t>10/31/22</a:t>
+              <a:t>11/21/22</a:t>
             </a:fld>
             <a:endParaRPr lang="en-US"/>
           </a:p>
@@ -3176,7 +3082,7 @@
           <a:p>
             <a:fld id="{E3A9BCBE-8A83-4E67-B3B6-D6A7A53377E1}" type="datetimeFigureOut">
               <a:rPr lang="en-US" smtClean="0"/>
-              <a:t>10/31/22</a:t>
+              <a:t>11/21/22</a:t>
             </a:fld>
             <a:endParaRPr lang="en-US"/>
           </a:p>
@@ -3389,7 +3295,7 @@
           <a:p>
             <a:fld id="{E3A9BCBE-8A83-4E67-B3B6-D6A7A53377E1}" type="datetimeFigureOut">
               <a:rPr lang="en-US" smtClean="0"/>
-              <a:t>10/31/22</a:t>
+              <a:t>11/21/22</a:t>
             </a:fld>
             <a:endParaRPr lang="en-US"/>
           </a:p>
@@ -8046,969 +7952,6 @@
     <p:extLst>
       <p:ext uri="{BB962C8B-B14F-4D97-AF65-F5344CB8AC3E}">
         <p14:creationId xmlns:p14="http://schemas.microsoft.com/office/powerpoint/2010/main" val="1486657600"/>
-      </p:ext>
-    </p:extLst>
-  </p:cSld>
-  <p:clrMapOvr>
-    <a:masterClrMapping/>
-  </p:clrMapOvr>
-</p:sld>
-</file>
-
-<file path=ppt/slides/slide5.xml><?xml version="1.0" encoding="utf-8"?>
-<p:sld xmlns:a="http://schemas.openxmlformats.org/drawingml/2006/main" xmlns:r="http://schemas.openxmlformats.org/officeDocument/2006/relationships" xmlns:p="http://schemas.openxmlformats.org/presentationml/2006/main">
-  <p:cSld>
-    <p:spTree>
-      <p:nvGrpSpPr>
-        <p:cNvPr id="1" name=""/>
-        <p:cNvGrpSpPr/>
-        <p:nvPr/>
-      </p:nvGrpSpPr>
-      <p:grpSpPr>
-        <a:xfrm>
-          <a:off x="0" y="0"/>
-          <a:ext cx="0" cy="0"/>
-          <a:chOff x="0" y="0"/>
-          <a:chExt cx="0" cy="0"/>
-        </a:xfrm>
-      </p:grpSpPr>
-      <p:pic>
-        <p:nvPicPr>
-          <p:cNvPr id="4" name="Picture 3">
-            <a:extLst>
-              <a:ext uri="{FF2B5EF4-FFF2-40B4-BE49-F238E27FC236}">
-                <a16:creationId xmlns:a16="http://schemas.microsoft.com/office/drawing/2014/main" id="{88939230-78B8-4AC8-5061-BFB674AAF54B}"/>
-              </a:ext>
-            </a:extLst>
-          </p:cNvPr>
-          <p:cNvPicPr>
-            <a:picLocks noChangeAspect="1"/>
-          </p:cNvPicPr>
-          <p:nvPr/>
-        </p:nvPicPr>
-        <p:blipFill>
-          <a:blip r:embed="rId3">
-            <a:extLst>
-              <a:ext uri="{28A0092B-C50C-407E-A947-70E740481C1C}">
-                <a14:useLocalDpi xmlns:a14="http://schemas.microsoft.com/office/drawing/2010/main" val="0"/>
-              </a:ext>
-            </a:extLst>
-          </a:blip>
-          <a:srcRect/>
-          <a:stretch/>
-        </p:blipFill>
-        <p:spPr>
-          <a:xfrm>
-            <a:off x="5480813" y="284106"/>
-            <a:ext cx="6397548" cy="6397548"/>
-          </a:xfrm>
-          <a:prstGeom prst="rect">
-            <a:avLst/>
-          </a:prstGeom>
-        </p:spPr>
-      </p:pic>
-      <mc:AlternateContent xmlns:mc="http://schemas.openxmlformats.org/markup-compatibility/2006" xmlns:a14="http://schemas.microsoft.com/office/drawing/2010/main">
-        <mc:Choice Requires="a14">
-          <p:sp>
-            <p:nvSpPr>
-              <p:cNvPr id="24" name="TextBox 23">
-                <a:extLst>
-                  <a:ext uri="{FF2B5EF4-FFF2-40B4-BE49-F238E27FC236}">
-                    <a16:creationId xmlns:a16="http://schemas.microsoft.com/office/drawing/2014/main" id="{FF06F500-4FD9-F1AC-05A1-9228D8926818}"/>
-                  </a:ext>
-                </a:extLst>
-              </p:cNvPr>
-              <p:cNvSpPr txBox="1"/>
-              <p:nvPr/>
-            </p:nvSpPr>
-            <p:spPr>
-              <a:xfrm rot="16200000">
-                <a:off x="4377442" y="1059006"/>
-                <a:ext cx="1795990" cy="523220"/>
-              </a:xfrm>
-              <a:prstGeom prst="rect">
-                <a:avLst/>
-              </a:prstGeom>
-              <a:noFill/>
-            </p:spPr>
-            <p:txBody>
-              <a:bodyPr wrap="square" rtlCol="0">
-                <a:spAutoFit/>
-              </a:bodyPr>
-              <a:lstStyle/>
-              <a:p>
-                <a:pPr algn="ctr"/>
-                <a:r>
-                  <a:rPr lang="en-US" sz="1400" b="1" dirty="0">
-                    <a:latin typeface="Cambria" panose="02040503050406030204" pitchFamily="18" charset="0"/>
-                  </a:rPr>
-                  <a:t>No. of Overlaps (</a:t>
-                </a:r>
-                <a14:m>
-                  <m:oMath xmlns:m="http://schemas.openxmlformats.org/officeDocument/2006/math">
-                    <m:r>
-                      <a:rPr lang="en-US" sz="1400" b="1" i="1" dirty="0" smtClean="0">
-                        <a:latin typeface="Cambria Math" panose="02040503050406030204" pitchFamily="18" charset="0"/>
-                        <a:ea typeface="Cambria Math" panose="02040503050406030204" pitchFamily="18" charset="0"/>
-                      </a:rPr>
-                      <m:t>×</m:t>
-                    </m:r>
-                  </m:oMath>
-                </a14:m>
-                <a:r>
-                  <a:rPr lang="en-US" sz="1400" b="1" dirty="0">
-                    <a:latin typeface="Cambria" panose="02040503050406030204" pitchFamily="18" charset="0"/>
-                  </a:rPr>
-                  <a:t>10</a:t>
-                </a:r>
-                <a:r>
-                  <a:rPr lang="en-US" sz="1400" b="1" baseline="30000" dirty="0">
-                    <a:latin typeface="Cambria" panose="02040503050406030204" pitchFamily="18" charset="0"/>
-                  </a:rPr>
-                  <a:t>6</a:t>
-                </a:r>
-                <a:r>
-                  <a:rPr lang="en-US" sz="1400" b="1" dirty="0">
-                    <a:latin typeface="Cambria" panose="02040503050406030204" pitchFamily="18" charset="0"/>
-                  </a:rPr>
-                  <a:t>)</a:t>
-                </a:r>
-              </a:p>
-            </p:txBody>
-          </p:sp>
-        </mc:Choice>
-        <mc:Fallback xmlns="">
-          <p:sp>
-            <p:nvSpPr>
-              <p:cNvPr id="24" name="TextBox 23">
-                <a:extLst>
-                  <a:ext uri="{FF2B5EF4-FFF2-40B4-BE49-F238E27FC236}">
-                    <a16:creationId xmlns:a16="http://schemas.microsoft.com/office/drawing/2014/main" id="{FF06F500-4FD9-F1AC-05A1-9228D8926818}"/>
-                  </a:ext>
-                </a:extLst>
-              </p:cNvPr>
-              <p:cNvSpPr txBox="1">
-                <a:spLocks noRot="1" noChangeAspect="1" noMove="1" noResize="1" noEditPoints="1" noAdjustHandles="1" noChangeArrowheads="1" noChangeShapeType="1" noTextEdit="1"/>
-              </p:cNvSpPr>
-              <p:nvPr/>
-            </p:nvSpPr>
-            <p:spPr>
-              <a:xfrm rot="16200000">
-                <a:off x="4377442" y="1059006"/>
-                <a:ext cx="1795990" cy="523220"/>
-              </a:xfrm>
-              <a:prstGeom prst="rect">
-                <a:avLst/>
-              </a:prstGeom>
-              <a:blipFill>
-                <a:blip r:embed="rId4"/>
-                <a:stretch>
-                  <a:fillRect r="-11905"/>
-                </a:stretch>
-              </a:blipFill>
-            </p:spPr>
-            <p:txBody>
-              <a:bodyPr/>
-              <a:lstStyle/>
-              <a:p>
-                <a:r>
-                  <a:rPr lang="en-CH">
-                    <a:noFill/>
-                  </a:rPr>
-                  <a:t> </a:t>
-                </a:r>
-              </a:p>
-            </p:txBody>
-          </p:sp>
-        </mc:Fallback>
-      </mc:AlternateContent>
-      <p:sp>
-        <p:nvSpPr>
-          <p:cNvPr id="46" name="TextBox 45">
-            <a:extLst>
-              <a:ext uri="{FF2B5EF4-FFF2-40B4-BE49-F238E27FC236}">
-                <a16:creationId xmlns:a16="http://schemas.microsoft.com/office/drawing/2014/main" id="{F443B727-9088-832B-96AF-598024775321}"/>
-              </a:ext>
-            </a:extLst>
-          </p:cNvPr>
-          <p:cNvSpPr txBox="1"/>
-          <p:nvPr/>
-        </p:nvSpPr>
-        <p:spPr>
-          <a:xfrm rot="16200000">
-            <a:off x="4377442" y="3280658"/>
-            <a:ext cx="1795990" cy="523220"/>
-          </a:xfrm>
-          <a:prstGeom prst="rect">
-            <a:avLst/>
-          </a:prstGeom>
-          <a:noFill/>
-        </p:spPr>
-        <p:txBody>
-          <a:bodyPr wrap="square" rtlCol="0">
-            <a:spAutoFit/>
-          </a:bodyPr>
-          <a:lstStyle/>
-          <a:p>
-            <a:pPr algn="ctr"/>
-            <a:r>
-              <a:rPr lang="en-US" sz="1400" b="1" dirty="0">
-                <a:latin typeface="Cambria" panose="02040503050406030204" pitchFamily="18" charset="0"/>
-              </a:rPr>
-              <a:t>Avg. Overlap Length (</a:t>
-            </a:r>
-            <a:r>
-              <a:rPr lang="en-US" sz="1400" b="1" dirty="0" err="1">
-                <a:latin typeface="Cambria" panose="02040503050406030204" pitchFamily="18" charset="0"/>
-              </a:rPr>
-              <a:t>Kbp</a:t>
-            </a:r>
-            <a:r>
-              <a:rPr lang="en-US" sz="1400" b="1" dirty="0">
-                <a:latin typeface="Cambria" panose="02040503050406030204" pitchFamily="18" charset="0"/>
-              </a:rPr>
-              <a:t>)</a:t>
-            </a:r>
-          </a:p>
-        </p:txBody>
-      </p:sp>
-      <p:sp>
-        <p:nvSpPr>
-          <p:cNvPr id="70" name="TextBox 69">
-            <a:extLst>
-              <a:ext uri="{FF2B5EF4-FFF2-40B4-BE49-F238E27FC236}">
-                <a16:creationId xmlns:a16="http://schemas.microsoft.com/office/drawing/2014/main" id="{2A1639C4-5FBA-6875-0661-5D963D078CF1}"/>
-              </a:ext>
-            </a:extLst>
-          </p:cNvPr>
-          <p:cNvSpPr txBox="1"/>
-          <p:nvPr/>
-        </p:nvSpPr>
-        <p:spPr>
-          <a:xfrm rot="16200000">
-            <a:off x="4377442" y="5438810"/>
-            <a:ext cx="1795990" cy="523220"/>
-          </a:xfrm>
-          <a:prstGeom prst="rect">
-            <a:avLst/>
-          </a:prstGeom>
-          <a:noFill/>
-        </p:spPr>
-        <p:txBody>
-          <a:bodyPr wrap="square" rtlCol="0">
-            <a:spAutoFit/>
-          </a:bodyPr>
-          <a:lstStyle/>
-          <a:p>
-            <a:pPr algn="ctr"/>
-            <a:r>
-              <a:rPr lang="en-US" sz="1400" b="1" dirty="0">
-                <a:latin typeface="Cambria" panose="02040503050406030204" pitchFamily="18" charset="0"/>
-              </a:rPr>
-              <a:t>Avg. Seeds per Overlap</a:t>
-            </a:r>
-          </a:p>
-        </p:txBody>
-      </p:sp>
-      <p:grpSp>
-        <p:nvGrpSpPr>
-          <p:cNvPr id="2" name="Group 1">
-            <a:extLst>
-              <a:ext uri="{FF2B5EF4-FFF2-40B4-BE49-F238E27FC236}">
-                <a16:creationId xmlns:a16="http://schemas.microsoft.com/office/drawing/2014/main" id="{3C307FAD-27FF-2FBA-4B2A-DC573E691E36}"/>
-              </a:ext>
-            </a:extLst>
-          </p:cNvPr>
-          <p:cNvGrpSpPr/>
-          <p:nvPr/>
-        </p:nvGrpSpPr>
-        <p:grpSpPr>
-          <a:xfrm>
-            <a:off x="6256989" y="-6418"/>
-            <a:ext cx="4845197" cy="307777"/>
-            <a:chOff x="6486482" y="-6418"/>
-            <a:chExt cx="4845197" cy="307777"/>
-          </a:xfrm>
-        </p:grpSpPr>
-        <p:grpSp>
-          <p:nvGrpSpPr>
-            <p:cNvPr id="3" name="Group 2">
-              <a:extLst>
-                <a:ext uri="{FF2B5EF4-FFF2-40B4-BE49-F238E27FC236}">
-                  <a16:creationId xmlns:a16="http://schemas.microsoft.com/office/drawing/2014/main" id="{81B2C4E9-C00C-7990-DD6E-41A56E2C7E36}"/>
-                </a:ext>
-              </a:extLst>
-            </p:cNvPr>
-            <p:cNvGrpSpPr/>
-            <p:nvPr/>
-          </p:nvGrpSpPr>
-          <p:grpSpPr>
-            <a:xfrm>
-              <a:off x="9983298" y="-6418"/>
-              <a:ext cx="1348381" cy="307777"/>
-              <a:chOff x="7143202" y="248652"/>
-              <a:chExt cx="1348381" cy="307777"/>
-            </a:xfrm>
-          </p:grpSpPr>
-          <p:sp>
-            <p:nvSpPr>
-              <p:cNvPr id="14" name="Rectangle 13">
-                <a:extLst>
-                  <a:ext uri="{FF2B5EF4-FFF2-40B4-BE49-F238E27FC236}">
-                    <a16:creationId xmlns:a16="http://schemas.microsoft.com/office/drawing/2014/main" id="{9594FD6F-F21B-814D-F83F-747AC8064B4E}"/>
-                  </a:ext>
-                </a:extLst>
-              </p:cNvPr>
-              <p:cNvSpPr/>
-              <p:nvPr/>
-            </p:nvSpPr>
-            <p:spPr>
-              <a:xfrm>
-                <a:off x="7143202" y="305385"/>
-                <a:ext cx="217170" cy="194310"/>
-              </a:xfrm>
-              <a:prstGeom prst="rect">
-                <a:avLst/>
-              </a:prstGeom>
-              <a:solidFill>
-                <a:srgbClr val="5FA137"/>
-              </a:solidFill>
-            </p:spPr>
-            <p:style>
-              <a:lnRef idx="2">
-                <a:schemeClr val="accent1">
-                  <a:shade val="50000"/>
-                </a:schemeClr>
-              </a:lnRef>
-              <a:fillRef idx="1">
-                <a:schemeClr val="accent1"/>
-              </a:fillRef>
-              <a:effectRef idx="0">
-                <a:schemeClr val="accent1"/>
-              </a:effectRef>
-              <a:fontRef idx="minor">
-                <a:schemeClr val="lt1"/>
-              </a:fontRef>
-            </p:style>
-            <p:txBody>
-              <a:bodyPr rtlCol="0" anchor="ctr"/>
-              <a:lstStyle/>
-              <a:p>
-                <a:pPr algn="ctr"/>
-                <a:endParaRPr lang="en-US" sz="1400">
-                  <a:latin typeface="Cambria" panose="02040503050406030204" pitchFamily="18" charset="0"/>
-                </a:endParaRPr>
-              </a:p>
-            </p:txBody>
-          </p:sp>
-          <p:sp>
-            <p:nvSpPr>
-              <p:cNvPr id="15" name="TextBox 14">
-                <a:extLst>
-                  <a:ext uri="{FF2B5EF4-FFF2-40B4-BE49-F238E27FC236}">
-                    <a16:creationId xmlns:a16="http://schemas.microsoft.com/office/drawing/2014/main" id="{17CA0BB2-2323-A245-40DC-AD9F3B3AA5FF}"/>
-                  </a:ext>
-                </a:extLst>
-              </p:cNvPr>
-              <p:cNvSpPr txBox="1"/>
-              <p:nvPr/>
-            </p:nvSpPr>
-            <p:spPr>
-              <a:xfrm>
-                <a:off x="7362042" y="248652"/>
-                <a:ext cx="1129541" cy="307777"/>
-              </a:xfrm>
-              <a:prstGeom prst="rect">
-                <a:avLst/>
-              </a:prstGeom>
-              <a:noFill/>
-            </p:spPr>
-            <p:txBody>
-              <a:bodyPr wrap="none" rtlCol="0">
-                <a:spAutoFit/>
-              </a:bodyPr>
-              <a:lstStyle/>
-              <a:p>
-                <a:pPr algn="ctr"/>
-                <a:r>
-                  <a:rPr lang="en-US" sz="1400" dirty="0" err="1">
-                    <a:latin typeface="Cambria" panose="02040503050406030204" pitchFamily="18" charset="0"/>
-                  </a:rPr>
-                  <a:t>minimap</a:t>
-                </a:r>
-                <a:r>
-                  <a:rPr lang="en-US" sz="1400" dirty="0">
-                    <a:latin typeface="Cambria" panose="02040503050406030204" pitchFamily="18" charset="0"/>
-                  </a:rPr>
-                  <a:t>-Eq</a:t>
-                </a:r>
-              </a:p>
-            </p:txBody>
-          </p:sp>
-        </p:grpSp>
-        <p:grpSp>
-          <p:nvGrpSpPr>
-            <p:cNvPr id="5" name="Group 4">
-              <a:extLst>
-                <a:ext uri="{FF2B5EF4-FFF2-40B4-BE49-F238E27FC236}">
-                  <a16:creationId xmlns:a16="http://schemas.microsoft.com/office/drawing/2014/main" id="{384683C2-EEF8-8FB0-44EF-5C98FAE3A12A}"/>
-                </a:ext>
-              </a:extLst>
-            </p:cNvPr>
-            <p:cNvGrpSpPr/>
-            <p:nvPr/>
-          </p:nvGrpSpPr>
-          <p:grpSpPr>
-            <a:xfrm>
-              <a:off x="8117995" y="-6418"/>
-              <a:ext cx="1192961" cy="307777"/>
-              <a:chOff x="5657014" y="248652"/>
-              <a:chExt cx="1192961" cy="307777"/>
-            </a:xfrm>
-          </p:grpSpPr>
-          <p:sp>
-            <p:nvSpPr>
-              <p:cNvPr id="12" name="Rectangle 11">
-                <a:extLst>
-                  <a:ext uri="{FF2B5EF4-FFF2-40B4-BE49-F238E27FC236}">
-                    <a16:creationId xmlns:a16="http://schemas.microsoft.com/office/drawing/2014/main" id="{78E77E41-B13B-F957-C5A3-388602A6979A}"/>
-                  </a:ext>
-                </a:extLst>
-              </p:cNvPr>
-              <p:cNvSpPr/>
-              <p:nvPr/>
-            </p:nvSpPr>
-            <p:spPr>
-              <a:xfrm>
-                <a:off x="5657014" y="305385"/>
-                <a:ext cx="217170" cy="194310"/>
-              </a:xfrm>
-              <a:prstGeom prst="rect">
-                <a:avLst/>
-              </a:prstGeom>
-              <a:solidFill>
-                <a:srgbClr val="F0C141"/>
-              </a:solidFill>
-            </p:spPr>
-            <p:style>
-              <a:lnRef idx="2">
-                <a:schemeClr val="accent1">
-                  <a:shade val="50000"/>
-                </a:schemeClr>
-              </a:lnRef>
-              <a:fillRef idx="1">
-                <a:schemeClr val="accent1"/>
-              </a:fillRef>
-              <a:effectRef idx="0">
-                <a:schemeClr val="accent1"/>
-              </a:effectRef>
-              <a:fontRef idx="minor">
-                <a:schemeClr val="lt1"/>
-              </a:fontRef>
-            </p:style>
-            <p:txBody>
-              <a:bodyPr rtlCol="0" anchor="ctr"/>
-              <a:lstStyle/>
-              <a:p>
-                <a:pPr algn="ctr"/>
-                <a:endParaRPr lang="en-US" sz="1400">
-                  <a:latin typeface="Cambria" panose="02040503050406030204" pitchFamily="18" charset="0"/>
-                </a:endParaRPr>
-              </a:p>
-            </p:txBody>
-          </p:sp>
-          <p:sp>
-            <p:nvSpPr>
-              <p:cNvPr id="13" name="TextBox 12">
-                <a:extLst>
-                  <a:ext uri="{FF2B5EF4-FFF2-40B4-BE49-F238E27FC236}">
-                    <a16:creationId xmlns:a16="http://schemas.microsoft.com/office/drawing/2014/main" id="{0C08D85E-40AB-F44F-D7C5-CB093E6BBED4}"/>
-                  </a:ext>
-                </a:extLst>
-              </p:cNvPr>
-              <p:cNvSpPr txBox="1"/>
-              <p:nvPr/>
-            </p:nvSpPr>
-            <p:spPr>
-              <a:xfrm>
-                <a:off x="5879838" y="248652"/>
-                <a:ext cx="970137" cy="307777"/>
-              </a:xfrm>
-              <a:prstGeom prst="rect">
-                <a:avLst/>
-              </a:prstGeom>
-              <a:noFill/>
-            </p:spPr>
-            <p:txBody>
-              <a:bodyPr wrap="none" rtlCol="0">
-                <a:spAutoFit/>
-              </a:bodyPr>
-              <a:lstStyle/>
-              <a:p>
-                <a:pPr algn="ctr"/>
-                <a:r>
-                  <a:rPr lang="en-US" sz="1400" dirty="0">
-                    <a:latin typeface="Cambria" panose="02040503050406030204" pitchFamily="18" charset="0"/>
-                  </a:rPr>
-                  <a:t>minimap2</a:t>
-                </a:r>
-              </a:p>
-            </p:txBody>
-          </p:sp>
-        </p:grpSp>
-        <p:grpSp>
-          <p:nvGrpSpPr>
-            <p:cNvPr id="6" name="Group 5">
-              <a:extLst>
-                <a:ext uri="{FF2B5EF4-FFF2-40B4-BE49-F238E27FC236}">
-                  <a16:creationId xmlns:a16="http://schemas.microsoft.com/office/drawing/2014/main" id="{8095805D-8A2A-4015-A61F-F8780EA03620}"/>
-                </a:ext>
-              </a:extLst>
-            </p:cNvPr>
-            <p:cNvGrpSpPr/>
-            <p:nvPr/>
-          </p:nvGrpSpPr>
-          <p:grpSpPr>
-            <a:xfrm>
-              <a:off x="6486482" y="-6418"/>
-              <a:ext cx="1073563" cy="307777"/>
-              <a:chOff x="3780870" y="283158"/>
-              <a:chExt cx="1073563" cy="307777"/>
-            </a:xfrm>
-          </p:grpSpPr>
-          <p:sp>
-            <p:nvSpPr>
-              <p:cNvPr id="7" name="Rectangle 6">
-                <a:extLst>
-                  <a:ext uri="{FF2B5EF4-FFF2-40B4-BE49-F238E27FC236}">
-                    <a16:creationId xmlns:a16="http://schemas.microsoft.com/office/drawing/2014/main" id="{0978715D-FC2B-AFD7-A72A-A0773C11AC90}"/>
-                  </a:ext>
-                </a:extLst>
-              </p:cNvPr>
-              <p:cNvSpPr/>
-              <p:nvPr/>
-            </p:nvSpPr>
-            <p:spPr>
-              <a:xfrm>
-                <a:off x="3780870" y="339891"/>
-                <a:ext cx="217170" cy="194310"/>
-              </a:xfrm>
-              <a:prstGeom prst="rect">
-                <a:avLst/>
-              </a:prstGeom>
-              <a:solidFill>
-                <a:srgbClr val="4A72BC"/>
-              </a:solidFill>
-            </p:spPr>
-            <p:style>
-              <a:lnRef idx="2">
-                <a:schemeClr val="accent1">
-                  <a:shade val="50000"/>
-                </a:schemeClr>
-              </a:lnRef>
-              <a:fillRef idx="1">
-                <a:schemeClr val="accent1"/>
-              </a:fillRef>
-              <a:effectRef idx="0">
-                <a:schemeClr val="accent1"/>
-              </a:effectRef>
-              <a:fontRef idx="minor">
-                <a:schemeClr val="lt1"/>
-              </a:fontRef>
-            </p:style>
-            <p:txBody>
-              <a:bodyPr rtlCol="0" anchor="ctr"/>
-              <a:lstStyle/>
-              <a:p>
-                <a:pPr algn="ctr"/>
-                <a:endParaRPr lang="en-US" sz="1400" dirty="0">
-                  <a:latin typeface="Cambria" panose="02040503050406030204" pitchFamily="18" charset="0"/>
-                </a:endParaRPr>
-              </a:p>
-            </p:txBody>
-          </p:sp>
-          <p:sp>
-            <p:nvSpPr>
-              <p:cNvPr id="11" name="TextBox 10">
-                <a:extLst>
-                  <a:ext uri="{FF2B5EF4-FFF2-40B4-BE49-F238E27FC236}">
-                    <a16:creationId xmlns:a16="http://schemas.microsoft.com/office/drawing/2014/main" id="{27BF4A58-7914-E5F3-7C43-3CD52E30B3D4}"/>
-                  </a:ext>
-                </a:extLst>
-              </p:cNvPr>
-              <p:cNvSpPr txBox="1"/>
-              <p:nvPr/>
-            </p:nvSpPr>
-            <p:spPr>
-              <a:xfrm>
-                <a:off x="4004520" y="283158"/>
-                <a:ext cx="849913" cy="307777"/>
-              </a:xfrm>
-              <a:prstGeom prst="rect">
-                <a:avLst/>
-              </a:prstGeom>
-              <a:noFill/>
-            </p:spPr>
-            <p:txBody>
-              <a:bodyPr wrap="none" rtlCol="0">
-                <a:spAutoFit/>
-              </a:bodyPr>
-              <a:lstStyle/>
-              <a:p>
-                <a:pPr algn="ctr"/>
-                <a:r>
-                  <a:rPr lang="en-US" sz="1400" dirty="0">
-                    <a:latin typeface="Cambria" panose="02040503050406030204" pitchFamily="18" charset="0"/>
-                  </a:rPr>
-                  <a:t>BLEND-I</a:t>
-                </a:r>
-              </a:p>
-            </p:txBody>
-          </p:sp>
-        </p:grpSp>
-      </p:grpSp>
-      <p:sp>
-        <p:nvSpPr>
-          <p:cNvPr id="8" name="TextBox 7">
-            <a:extLst>
-              <a:ext uri="{FF2B5EF4-FFF2-40B4-BE49-F238E27FC236}">
-                <a16:creationId xmlns:a16="http://schemas.microsoft.com/office/drawing/2014/main" id="{0CB10F94-9B51-F639-4749-CB4084321240}"/>
-              </a:ext>
-            </a:extLst>
-          </p:cNvPr>
-          <p:cNvSpPr txBox="1"/>
-          <p:nvPr/>
-        </p:nvSpPr>
-        <p:spPr>
-          <a:xfrm>
-            <a:off x="5709777" y="6586266"/>
-            <a:ext cx="780983" cy="523220"/>
-          </a:xfrm>
-          <a:prstGeom prst="rect">
-            <a:avLst/>
-          </a:prstGeom>
-          <a:noFill/>
-        </p:spPr>
-        <p:txBody>
-          <a:bodyPr wrap="none" rtlCol="0">
-            <a:spAutoFit/>
-          </a:bodyPr>
-          <a:lstStyle/>
-          <a:p>
-            <a:pPr algn="ctr"/>
-            <a:r>
-              <a:rPr lang="en-US" sz="1400" b="1" dirty="0">
-                <a:latin typeface="Cambria" panose="02040503050406030204" pitchFamily="18" charset="0"/>
-              </a:rPr>
-              <a:t>CHM13</a:t>
-            </a:r>
-          </a:p>
-          <a:p>
-            <a:pPr algn="ctr"/>
-            <a:r>
-              <a:rPr lang="en-US" sz="1400" b="1" dirty="0">
-                <a:latin typeface="Cambria" panose="02040503050406030204" pitchFamily="18" charset="0"/>
-              </a:rPr>
-              <a:t>(HiFi)</a:t>
-            </a:r>
-          </a:p>
-        </p:txBody>
-      </p:sp>
-      <p:sp>
-        <p:nvSpPr>
-          <p:cNvPr id="9" name="TextBox 8">
-            <a:extLst>
-              <a:ext uri="{FF2B5EF4-FFF2-40B4-BE49-F238E27FC236}">
-                <a16:creationId xmlns:a16="http://schemas.microsoft.com/office/drawing/2014/main" id="{9F569C2C-EF7F-9000-9A0C-C796EF487692}"/>
-              </a:ext>
-            </a:extLst>
-          </p:cNvPr>
-          <p:cNvSpPr txBox="1"/>
-          <p:nvPr/>
-        </p:nvSpPr>
-        <p:spPr>
-          <a:xfrm>
-            <a:off x="8437757" y="6586266"/>
-            <a:ext cx="780983" cy="523220"/>
-          </a:xfrm>
-          <a:prstGeom prst="rect">
-            <a:avLst/>
-          </a:prstGeom>
-          <a:noFill/>
-        </p:spPr>
-        <p:txBody>
-          <a:bodyPr wrap="none" rtlCol="0">
-            <a:spAutoFit/>
-          </a:bodyPr>
-          <a:lstStyle/>
-          <a:p>
-            <a:pPr algn="ctr"/>
-            <a:r>
-              <a:rPr lang="en-US" sz="1400" b="1" dirty="0">
-                <a:latin typeface="Cambria" panose="02040503050406030204" pitchFamily="18" charset="0"/>
-              </a:rPr>
-              <a:t>CHM13</a:t>
-            </a:r>
-          </a:p>
-          <a:p>
-            <a:pPr algn="ctr"/>
-            <a:r>
-              <a:rPr lang="en-US" sz="1400" b="1" dirty="0">
-                <a:latin typeface="Cambria" panose="02040503050406030204" pitchFamily="18" charset="0"/>
-              </a:rPr>
-              <a:t>(ONT)</a:t>
-            </a:r>
-          </a:p>
-        </p:txBody>
-      </p:sp>
-      <p:sp>
-        <p:nvSpPr>
-          <p:cNvPr id="10" name="TextBox 9">
-            <a:extLst>
-              <a:ext uri="{FF2B5EF4-FFF2-40B4-BE49-F238E27FC236}">
-                <a16:creationId xmlns:a16="http://schemas.microsoft.com/office/drawing/2014/main" id="{57EE35ED-02F0-114C-9FF6-F70874F56BAF}"/>
-              </a:ext>
-            </a:extLst>
-          </p:cNvPr>
-          <p:cNvSpPr txBox="1"/>
-          <p:nvPr/>
-        </p:nvSpPr>
-        <p:spPr>
-          <a:xfrm>
-            <a:off x="9286978" y="6586266"/>
-            <a:ext cx="895245" cy="523220"/>
-          </a:xfrm>
-          <a:prstGeom prst="rect">
-            <a:avLst/>
-          </a:prstGeom>
-          <a:noFill/>
-        </p:spPr>
-        <p:txBody>
-          <a:bodyPr wrap="none" rtlCol="0">
-            <a:spAutoFit/>
-          </a:bodyPr>
-          <a:lstStyle/>
-          <a:p>
-            <a:pPr algn="ctr"/>
-            <a:r>
-              <a:rPr lang="en-US" sz="1400" b="1" dirty="0">
-                <a:latin typeface="Cambria" panose="02040503050406030204" pitchFamily="18" charset="0"/>
-              </a:rPr>
-              <a:t>Yeast</a:t>
-            </a:r>
-          </a:p>
-          <a:p>
-            <a:pPr algn="ctr"/>
-            <a:r>
-              <a:rPr lang="en-US" sz="1400" b="1" dirty="0">
-                <a:latin typeface="Cambria" panose="02040503050406030204" pitchFamily="18" charset="0"/>
-              </a:rPr>
-              <a:t>(PacBio)</a:t>
-            </a:r>
-          </a:p>
-        </p:txBody>
-      </p:sp>
-      <p:sp>
-        <p:nvSpPr>
-          <p:cNvPr id="16" name="TextBox 15">
-            <a:extLst>
-              <a:ext uri="{FF2B5EF4-FFF2-40B4-BE49-F238E27FC236}">
-                <a16:creationId xmlns:a16="http://schemas.microsoft.com/office/drawing/2014/main" id="{F7184A7C-50E1-510D-6656-0BE5EA788948}"/>
-              </a:ext>
-            </a:extLst>
-          </p:cNvPr>
-          <p:cNvSpPr txBox="1"/>
-          <p:nvPr/>
-        </p:nvSpPr>
-        <p:spPr>
-          <a:xfrm>
-            <a:off x="6410933" y="6586266"/>
-            <a:ext cx="1249508" cy="523220"/>
-          </a:xfrm>
-          <a:prstGeom prst="rect">
-            <a:avLst/>
-          </a:prstGeom>
-          <a:noFill/>
-        </p:spPr>
-        <p:txBody>
-          <a:bodyPr wrap="none" rtlCol="0">
-            <a:spAutoFit/>
-          </a:bodyPr>
-          <a:lstStyle/>
-          <a:p>
-            <a:pPr algn="ctr"/>
-            <a:r>
-              <a:rPr lang="en-US" sz="1400" b="1" dirty="0">
-                <a:latin typeface="Cambria" panose="02040503050406030204" pitchFamily="18" charset="0"/>
-              </a:rPr>
-              <a:t>D. </a:t>
-            </a:r>
-            <a:r>
-              <a:rPr lang="en-US" sz="1400" b="1" dirty="0" err="1">
-                <a:latin typeface="Cambria" panose="02040503050406030204" pitchFamily="18" charset="0"/>
-              </a:rPr>
-              <a:t>ananassae</a:t>
-            </a:r>
-            <a:endParaRPr lang="en-US" sz="1400" b="1" dirty="0">
-              <a:latin typeface="Cambria" panose="02040503050406030204" pitchFamily="18" charset="0"/>
-            </a:endParaRPr>
-          </a:p>
-          <a:p>
-            <a:pPr algn="ctr"/>
-            <a:r>
-              <a:rPr lang="en-US" sz="1400" b="1" dirty="0">
-                <a:latin typeface="Cambria" panose="02040503050406030204" pitchFamily="18" charset="0"/>
-              </a:rPr>
-              <a:t>(HiFi)</a:t>
-            </a:r>
-          </a:p>
-        </p:txBody>
-      </p:sp>
-      <p:sp>
-        <p:nvSpPr>
-          <p:cNvPr id="17" name="TextBox 16">
-            <a:extLst>
-              <a:ext uri="{FF2B5EF4-FFF2-40B4-BE49-F238E27FC236}">
-                <a16:creationId xmlns:a16="http://schemas.microsoft.com/office/drawing/2014/main" id="{26CBAC6B-845C-3E9D-9805-3D04BB297AA5}"/>
-              </a:ext>
-            </a:extLst>
-          </p:cNvPr>
-          <p:cNvSpPr txBox="1"/>
-          <p:nvPr/>
-        </p:nvSpPr>
-        <p:spPr>
-          <a:xfrm>
-            <a:off x="7577011" y="6586266"/>
-            <a:ext cx="686791" cy="523220"/>
-          </a:xfrm>
-          <a:prstGeom prst="rect">
-            <a:avLst/>
-          </a:prstGeom>
-          <a:noFill/>
-        </p:spPr>
-        <p:txBody>
-          <a:bodyPr wrap="none" rtlCol="0">
-            <a:spAutoFit/>
-          </a:bodyPr>
-          <a:lstStyle/>
-          <a:p>
-            <a:pPr algn="ctr"/>
-            <a:r>
-              <a:rPr lang="en-US" sz="1400" b="1" dirty="0">
-                <a:latin typeface="Cambria" panose="02040503050406030204" pitchFamily="18" charset="0"/>
-              </a:rPr>
-              <a:t>E. Coli</a:t>
-            </a:r>
-          </a:p>
-          <a:p>
-            <a:pPr algn="ctr"/>
-            <a:r>
-              <a:rPr lang="en-US" sz="1400" b="1" dirty="0">
-                <a:latin typeface="Cambria" panose="02040503050406030204" pitchFamily="18" charset="0"/>
-              </a:rPr>
-              <a:t>(HiFi)</a:t>
-            </a:r>
-          </a:p>
-        </p:txBody>
-      </p:sp>
-      <p:sp>
-        <p:nvSpPr>
-          <p:cNvPr id="18" name="TextBox 17">
-            <a:extLst>
-              <a:ext uri="{FF2B5EF4-FFF2-40B4-BE49-F238E27FC236}">
-                <a16:creationId xmlns:a16="http://schemas.microsoft.com/office/drawing/2014/main" id="{D0837158-A20B-BE3E-0D64-4B8F1D885147}"/>
-              </a:ext>
-            </a:extLst>
-          </p:cNvPr>
-          <p:cNvSpPr txBox="1"/>
-          <p:nvPr/>
-        </p:nvSpPr>
-        <p:spPr>
-          <a:xfrm>
-            <a:off x="10286746" y="6586266"/>
-            <a:ext cx="694421" cy="523220"/>
-          </a:xfrm>
-          <a:prstGeom prst="rect">
-            <a:avLst/>
-          </a:prstGeom>
-          <a:noFill/>
-        </p:spPr>
-        <p:txBody>
-          <a:bodyPr wrap="none" rtlCol="0">
-            <a:spAutoFit/>
-          </a:bodyPr>
-          <a:lstStyle/>
-          <a:p>
-            <a:pPr algn="ctr"/>
-            <a:r>
-              <a:rPr lang="en-US" sz="1400" b="1" dirty="0">
-                <a:latin typeface="Cambria" panose="02040503050406030204" pitchFamily="18" charset="0"/>
-              </a:rPr>
-              <a:t>Yeast</a:t>
-            </a:r>
-          </a:p>
-          <a:p>
-            <a:pPr algn="ctr"/>
-            <a:r>
-              <a:rPr lang="en-US" sz="1400" b="1" dirty="0">
-                <a:latin typeface="Cambria" panose="02040503050406030204" pitchFamily="18" charset="0"/>
-              </a:rPr>
-              <a:t>(ONT)</a:t>
-            </a:r>
-          </a:p>
-        </p:txBody>
-      </p:sp>
-      <p:sp>
-        <p:nvSpPr>
-          <p:cNvPr id="19" name="TextBox 18">
-            <a:extLst>
-              <a:ext uri="{FF2B5EF4-FFF2-40B4-BE49-F238E27FC236}">
-                <a16:creationId xmlns:a16="http://schemas.microsoft.com/office/drawing/2014/main" id="{D076DD97-B04D-6A9E-C47D-2184BE32E44E}"/>
-              </a:ext>
-            </a:extLst>
-          </p:cNvPr>
-          <p:cNvSpPr txBox="1"/>
-          <p:nvPr/>
-        </p:nvSpPr>
-        <p:spPr>
-          <a:xfrm>
-            <a:off x="11088822" y="6586266"/>
-            <a:ext cx="895245" cy="523220"/>
-          </a:xfrm>
-          <a:prstGeom prst="rect">
-            <a:avLst/>
-          </a:prstGeom>
-          <a:noFill/>
-        </p:spPr>
-        <p:txBody>
-          <a:bodyPr wrap="none" rtlCol="0">
-            <a:spAutoFit/>
-          </a:bodyPr>
-          <a:lstStyle/>
-          <a:p>
-            <a:pPr algn="ctr"/>
-            <a:r>
-              <a:rPr lang="en-US" sz="1400" b="1" dirty="0">
-                <a:latin typeface="Cambria" panose="02040503050406030204" pitchFamily="18" charset="0"/>
-              </a:rPr>
-              <a:t>E. Coli</a:t>
-            </a:r>
-          </a:p>
-          <a:p>
-            <a:pPr algn="ctr"/>
-            <a:r>
-              <a:rPr lang="en-US" sz="1400" b="1" dirty="0">
-                <a:latin typeface="Cambria" panose="02040503050406030204" pitchFamily="18" charset="0"/>
-              </a:rPr>
-              <a:t>(PacBio)</a:t>
-            </a:r>
-          </a:p>
-        </p:txBody>
-      </p:sp>
-    </p:spTree>
-    <p:extLst>
-      <p:ext uri="{BB962C8B-B14F-4D97-AF65-F5344CB8AC3E}">
-        <p14:creationId xmlns:p14="http://schemas.microsoft.com/office/powerpoint/2010/main" val="1156378657"/>
       </p:ext>
     </p:extLst>
   </p:cSld>

</xml_diff>